<commit_message>
added file uploading in Test.cs
</commit_message>
<xml_diff>
--- a/docs/vision/doc/תבנית בסיס להצגת ספרינט (1).pptx
+++ b/docs/vision/doc/תבנית בסיס להצגת ספרינט (1).pptx
@@ -230,7 +230,7 @@
           <a:p>
             <a:fld id="{03573BAD-26BF-45FC-A316-E1836D95B7B8}" type="datetimeFigureOut">
               <a:rPr lang="en-US" smtClean="0"/>
-              <a:t>1/21/2018</a:t>
+              <a:t>2/4/2018</a:t>
             </a:fld>
             <a:endParaRPr lang="en-US"/>
           </a:p>
@@ -821,7 +821,7 @@
           <a:p>
             <a:fld id="{ACE0332F-FCE7-43B8-8B44-ECBD436CDFD7}" type="datetimeFigureOut">
               <a:rPr lang="he-IL" smtClean="0"/>
-              <a:t>ה'/שבט/תשע"ח</a:t>
+              <a:t>י"ט/שבט/תשע"ח</a:t>
             </a:fld>
             <a:endParaRPr lang="he-IL"/>
           </a:p>
@@ -1014,7 +1014,7 @@
           <a:p>
             <a:fld id="{ACE0332F-FCE7-43B8-8B44-ECBD436CDFD7}" type="datetimeFigureOut">
               <a:rPr lang="he-IL" smtClean="0"/>
-              <a:t>ה'/שבט/תשע"ח</a:t>
+              <a:t>י"ט/שבט/תשע"ח</a:t>
             </a:fld>
             <a:endParaRPr lang="he-IL"/>
           </a:p>
@@ -1210,7 +1210,7 @@
           <a:p>
             <a:fld id="{ACE0332F-FCE7-43B8-8B44-ECBD436CDFD7}" type="datetimeFigureOut">
               <a:rPr lang="he-IL" smtClean="0"/>
-              <a:t>ה'/שבט/תשע"ח</a:t>
+              <a:t>י"ט/שבט/תשע"ח</a:t>
             </a:fld>
             <a:endParaRPr lang="he-IL"/>
           </a:p>
@@ -1396,7 +1396,7 @@
           <a:p>
             <a:fld id="{ACE0332F-FCE7-43B8-8B44-ECBD436CDFD7}" type="datetimeFigureOut">
               <a:rPr lang="he-IL" smtClean="0"/>
-              <a:t>ה'/שבט/תשע"ח</a:t>
+              <a:t>י"ט/שבט/תשע"ח</a:t>
             </a:fld>
             <a:endParaRPr lang="he-IL"/>
           </a:p>
@@ -1665,7 +1665,7 @@
           <a:p>
             <a:fld id="{ACE0332F-FCE7-43B8-8B44-ECBD436CDFD7}" type="datetimeFigureOut">
               <a:rPr lang="he-IL" smtClean="0"/>
-              <a:t>ה'/שבט/תשע"ח</a:t>
+              <a:t>י"ט/שבט/תשע"ח</a:t>
             </a:fld>
             <a:endParaRPr lang="he-IL"/>
           </a:p>
@@ -1920,7 +1920,7 @@
           <a:p>
             <a:fld id="{ACE0332F-FCE7-43B8-8B44-ECBD436CDFD7}" type="datetimeFigureOut">
               <a:rPr lang="he-IL" smtClean="0"/>
-              <a:t>ה'/שבט/תשע"ח</a:t>
+              <a:t>י"ט/שבט/תשע"ח</a:t>
             </a:fld>
             <a:endParaRPr lang="he-IL"/>
           </a:p>
@@ -2310,7 +2310,7 @@
           <a:p>
             <a:fld id="{ACE0332F-FCE7-43B8-8B44-ECBD436CDFD7}" type="datetimeFigureOut">
               <a:rPr lang="he-IL" smtClean="0"/>
-              <a:t>ה'/שבט/תשע"ח</a:t>
+              <a:t>י"ט/שבט/תשע"ח</a:t>
             </a:fld>
             <a:endParaRPr lang="he-IL"/>
           </a:p>
@@ -2451,7 +2451,7 @@
           <a:p>
             <a:fld id="{ACE0332F-FCE7-43B8-8B44-ECBD436CDFD7}" type="datetimeFigureOut">
               <a:rPr lang="he-IL" smtClean="0"/>
-              <a:t>ה'/שבט/תשע"ח</a:t>
+              <a:t>י"ט/שבט/תשע"ח</a:t>
             </a:fld>
             <a:endParaRPr lang="he-IL"/>
           </a:p>
@@ -2562,7 +2562,7 @@
           <a:p>
             <a:fld id="{ACE0332F-FCE7-43B8-8B44-ECBD436CDFD7}" type="datetimeFigureOut">
               <a:rPr lang="he-IL" smtClean="0"/>
-              <a:t>ה'/שבט/תשע"ח</a:t>
+              <a:t>י"ט/שבט/תשע"ח</a:t>
             </a:fld>
             <a:endParaRPr lang="he-IL"/>
           </a:p>
@@ -2855,7 +2855,7 @@
           <a:p>
             <a:fld id="{ACE0332F-FCE7-43B8-8B44-ECBD436CDFD7}" type="datetimeFigureOut">
               <a:rPr lang="he-IL" smtClean="0"/>
-              <a:t>ה'/שבט/תשע"ח</a:t>
+              <a:t>י"ט/שבט/תשע"ח</a:t>
             </a:fld>
             <a:endParaRPr lang="he-IL"/>
           </a:p>
@@ -3124,7 +3124,7 @@
           <a:p>
             <a:fld id="{ACE0332F-FCE7-43B8-8B44-ECBD436CDFD7}" type="datetimeFigureOut">
               <a:rPr lang="he-IL" smtClean="0"/>
-              <a:t>ה'/שבט/תשע"ח</a:t>
+              <a:t>י"ט/שבט/תשע"ח</a:t>
             </a:fld>
             <a:endParaRPr lang="he-IL"/>
           </a:p>
@@ -5625,11 +5625,7 @@
           <a:p>
             <a:r>
               <a:rPr lang="he-IL" dirty="0" smtClean="0"/>
-              <a:t>הצגת </a:t>
-            </a:r>
-            <a:r>
-              <a:rPr lang="he-IL" dirty="0" smtClean="0"/>
-              <a:t>ספרינט 2 </a:t>
+              <a:t>הצגת ספרינט 2 </a:t>
             </a:r>
             <a:r>
               <a:rPr lang="en-US" dirty="0" err="1" smtClean="0"/>
@@ -5659,16 +5655,16 @@
               <a:t>מציגים: </a:t>
             </a:r>
             <a:r>
-              <a:rPr lang="en-US" dirty="0" smtClean="0"/>
-              <a:t>%s1</a:t>
+              <a:rPr lang="en-US" dirty="0" err="1" smtClean="0"/>
+              <a:t>shai</a:t>
             </a:r>
             <a:r>
               <a:rPr lang="he-IL" dirty="0" smtClean="0"/>
               <a:t>, </a:t>
             </a:r>
             <a:r>
-              <a:rPr lang="en-US" dirty="0" smtClean="0"/>
-              <a:t>%s2</a:t>
+              <a:rPr lang="en-US" dirty="0" err="1" smtClean="0"/>
+              <a:t>yotam</a:t>
             </a:r>
             <a:r>
               <a:rPr lang="he-IL" dirty="0" smtClean="0"/>
@@ -5760,7 +5756,11 @@
           <a:p>
             <a:r>
               <a:rPr lang="he-IL" dirty="0" smtClean="0"/>
-              <a:t>להכין שרת</a:t>
+              <a:t>להכין </a:t>
+            </a:r>
+            <a:r>
+              <a:rPr lang="he-IL" dirty="0" smtClean="0"/>
+              <a:t>שרת לאתר אינטרנט</a:t>
             </a:r>
             <a:endParaRPr lang="he-IL" dirty="0" smtClean="0"/>
           </a:p>
@@ -5874,8 +5874,23 @@
           <a:p>
             <a:r>
               <a:rPr lang="he-IL" dirty="0" smtClean="0"/>
-              <a:t>הוספנו דפי התחברות והרשמה לאפליקציה</a:t>
-            </a:r>
+              <a:t>הוספנו דפי התחברות והרשמה </a:t>
+            </a:r>
+            <a:r>
+              <a:rPr lang="he-IL" dirty="0" smtClean="0"/>
+              <a:t>לאפליקציה</a:t>
+            </a:r>
+          </a:p>
+          <a:p>
+            <a:r>
+              <a:rPr lang="he-IL" dirty="0" smtClean="0"/>
+              <a:t>יצרנו אתר עם דפי התחברות </a:t>
+            </a:r>
+            <a:r>
+              <a:rPr lang="he-IL" smtClean="0"/>
+              <a:t>הרשמה ומידע</a:t>
+            </a:r>
+            <a:endParaRPr lang="he-IL" dirty="0" smtClean="0"/>
           </a:p>
         </p:txBody>
       </p:sp>
@@ -6039,11 +6054,7 @@
           <a:p>
             <a:r>
               <a:rPr lang="he-IL" dirty="0" smtClean="0"/>
-              <a:t>שימור</a:t>
-            </a:r>
-            <a:r>
-              <a:rPr lang="he-IL" dirty="0" smtClean="0"/>
-              <a:t>:</a:t>
+              <a:t>שימור:</a:t>
             </a:r>
           </a:p>
           <a:p>
@@ -6138,11 +6149,7 @@
           <a:p>
             <a:r>
               <a:rPr lang="he-IL" dirty="0" smtClean="0"/>
-              <a:t>שיפור</a:t>
-            </a:r>
-            <a:r>
-              <a:rPr lang="he-IL" dirty="0" smtClean="0"/>
-              <a:t>:</a:t>
+              <a:t>שיפור:</a:t>
             </a:r>
           </a:p>
           <a:p>

</xml_diff>